<commit_message>
updated ppt, and added lazy content
</commit_message>
<xml_diff>
--- a/Slides/Minicurso Elixir.pptx
+++ b/Slides/Minicurso Elixir.pptx
@@ -27,6 +27,8 @@
     <p:sldId id="272" r:id="rId25"/>
     <p:sldId id="273" r:id="rId26"/>
     <p:sldId id="274" r:id="rId27"/>
+    <p:sldId id="275" r:id="rId28"/>
+    <p:sldId id="276" r:id="rId29"/>
   </p:sldIdLst>
   <p:sldSz cx="13004800" cy="9753600"/>
   <p:notesSz cx="6858000" cy="9144000"/>
@@ -3150,8 +3152,8 @@
       </p:par>
     </p:tnLst>
     <p:bldLst>
+      <p:bldP build="whole" bldLvl="1" animBg="1" rev="0" advAuto="0" spid="75" grpId="2"/>
       <p:bldP build="whole" bldLvl="1" animBg="1" rev="0" advAuto="0" spid="74" grpId="1"/>
-      <p:bldP build="whole" bldLvl="1" animBg="1" rev="0" advAuto="0" spid="75" grpId="2"/>
     </p:bldLst>
   </p:timing>
 </p:sld>
@@ -3554,9 +3556,9 @@
       </p:par>
     </p:tnLst>
     <p:bldLst>
+      <p:bldP build="whole" bldLvl="1" animBg="1" rev="0" advAuto="0" spid="77" grpId="1"/>
       <p:bldP build="whole" bldLvl="1" animBg="1" rev="0" advAuto="0" spid="78" grpId="2"/>
       <p:bldP build="whole" bldLvl="1" animBg="1" rev="0" advAuto="0" spid="78" grpId="3"/>
-      <p:bldP build="whole" bldLvl="1" animBg="1" rev="0" advAuto="0" spid="77" grpId="1"/>
     </p:bldLst>
   </p:timing>
 </p:sld>
@@ -4166,9 +4168,1639 @@
           <a:chExt cx="0" cy="0"/>
         </a:xfrm>
       </p:grpSpPr>
+      <p:sp>
+        <p:nvSpPr>
+          <p:cNvPr id="91" name="Shape 91"/>
+          <p:cNvSpPr/>
+          <p:nvPr>
+            <p:ph type="title"/>
+          </p:nvPr>
+        </p:nvSpPr>
+        <p:spPr>
+          <a:prstGeom prst="rect">
+            <a:avLst/>
+          </a:prstGeom>
+        </p:spPr>
+        <p:txBody>
+          <a:bodyPr/>
+          <a:lstStyle/>
+          <a:p>
+            <a:pPr lvl="0">
+              <a:defRPr sz="1800"/>
+            </a:pPr>
+            <a:r>
+              <a:rPr sz="8000"/>
+              <a:t>Perfomance Showoff</a:t>
+            </a:r>
+          </a:p>
+        </p:txBody>
+      </p:sp>
+      <p:sp>
+        <p:nvSpPr>
+          <p:cNvPr id="92" name="Shape 92"/>
+          <p:cNvSpPr/>
+          <p:nvPr>
+            <p:ph type="body" idx="1"/>
+          </p:nvPr>
+        </p:nvSpPr>
+        <p:spPr>
+          <a:xfrm>
+            <a:off x="952499" y="3495228"/>
+            <a:ext cx="11099801" cy="5328242"/>
+          </a:xfrm>
+          <a:prstGeom prst="rect">
+            <a:avLst/>
+          </a:prstGeom>
+        </p:spPr>
+        <p:txBody>
+          <a:bodyPr/>
+          <a:lstStyle/>
+          <a:p>
+            <a:pPr lvl="0">
+              <a:defRPr sz="1800"/>
+            </a:pPr>
+            <a:r>
+              <a:rPr sz="3600"/>
+              <a:t>WhatsApp</a:t>
+            </a:r>
+            <a:endParaRPr sz="3600"/>
+          </a:p>
+          <a:p>
+            <a:pPr lvl="1">
+              <a:defRPr sz="1800"/>
+            </a:pPr>
+            <a:r>
+              <a:rPr sz="3600"/>
+              <a:t>2 milhões de conexões em um único nó</a:t>
+            </a:r>
+            <a:endParaRPr sz="3600"/>
+          </a:p>
+          <a:p>
+            <a:pPr lvl="1">
+              <a:defRPr sz="1800"/>
+            </a:pPr>
+            <a:r>
+              <a:rPr sz="3600"/>
+              <a:t>Intel Xeon @ 3.07Ghz</a:t>
+            </a:r>
+            <a:endParaRPr sz="3600"/>
+          </a:p>
+          <a:p>
+            <a:pPr lvl="1">
+              <a:defRPr sz="1800"/>
+            </a:pPr>
+            <a:r>
+              <a:rPr sz="3600"/>
+              <a:t>24 CPU — 96Gb</a:t>
+            </a:r>
+            <a:endParaRPr sz="3600"/>
+          </a:p>
+          <a:p>
+            <a:pPr lvl="1">
+              <a:defRPr sz="1800"/>
+            </a:pPr>
+            <a:r>
+              <a:rPr sz="3600"/>
+              <a:t>Usando 40% de CPU e Memória</a:t>
+            </a:r>
+          </a:p>
+        </p:txBody>
+      </p:sp>
+    </p:spTree>
+  </p:cSld>
+  <p:clrMapOvr>
+    <a:masterClrMapping/>
+  </p:clrMapOvr>
+  <p:transition spd="med" advClick="1"/>
+</p:sld>
+</file>
+
+<file path=ppt/slides/slide18.xml><?xml version="1.0" encoding="utf-8"?>
+<p:sld xmlns:a="http://schemas.openxmlformats.org/drawingml/2006/main" xmlns:r="http://schemas.openxmlformats.org/officeDocument/2006/relationships" xmlns:p="http://schemas.openxmlformats.org/presentationml/2006/main" showMasterSp="1" showMasterPhAnim="1">
+  <p:cSld>
+    <p:spTree>
+      <p:nvGrpSpPr>
+        <p:cNvPr id="1" name=""/>
+        <p:cNvGrpSpPr/>
+        <p:nvPr/>
+      </p:nvGrpSpPr>
+      <p:grpSpPr>
+        <a:xfrm>
+          <a:off x="0" y="0"/>
+          <a:ext cx="0" cy="0"/>
+          <a:chOff x="0" y="0"/>
+          <a:chExt cx="0" cy="0"/>
+        </a:xfrm>
+      </p:grpSpPr>
+      <p:sp>
+        <p:nvSpPr>
+          <p:cNvPr id="94" name="Shape 94"/>
+          <p:cNvSpPr/>
+          <p:nvPr>
+            <p:ph type="title"/>
+          </p:nvPr>
+        </p:nvSpPr>
+        <p:spPr>
+          <a:prstGeom prst="rect">
+            <a:avLst/>
+          </a:prstGeom>
+        </p:spPr>
+        <p:txBody>
+          <a:bodyPr/>
+          <a:lstStyle/>
+          <a:p>
+            <a:pPr lvl="0">
+              <a:defRPr sz="1800"/>
+            </a:pPr>
+            <a:r>
+              <a:rPr sz="8000"/>
+              <a:t>Phoenix Showdown</a:t>
+            </a:r>
+          </a:p>
+        </p:txBody>
+      </p:sp>
+      <p:sp>
+        <p:nvSpPr>
+          <p:cNvPr id="95" name="Shape 95"/>
+          <p:cNvSpPr/>
+          <p:nvPr>
+            <p:ph type="body" idx="1"/>
+          </p:nvPr>
+        </p:nvSpPr>
+        <p:spPr>
+          <a:xfrm>
+            <a:off x="952500" y="3495228"/>
+            <a:ext cx="5314577" cy="5394772"/>
+          </a:xfrm>
+          <a:prstGeom prst="rect">
+            <a:avLst/>
+          </a:prstGeom>
+        </p:spPr>
+        <p:txBody>
+          <a:bodyPr/>
+          <a:lstStyle/>
+          <a:p>
+            <a:pPr lvl="0">
+              <a:defRPr sz="1800"/>
+            </a:pPr>
+            <a:r>
+              <a:rPr sz="3600"/>
+              <a:t>Stats</a:t>
+            </a:r>
+            <a:endParaRPr sz="3600"/>
+          </a:p>
+          <a:p>
+            <a:pPr lvl="0">
+              <a:defRPr sz="1800"/>
+            </a:pPr>
+            <a:r>
+              <a:rPr sz="3600"/>
+              <a:t> 3.4GHZ Core i7 (quad core)</a:t>
+            </a:r>
+            <a:endParaRPr sz="3600"/>
+          </a:p>
+          <a:p>
+            <a:pPr lvl="0">
+              <a:defRPr sz="1800"/>
+            </a:pPr>
+            <a:r>
+              <a:rPr sz="3600"/>
+              <a:t>12GB RAM</a:t>
+            </a:r>
+            <a:endParaRPr sz="3600"/>
+          </a:p>
+          <a:p>
+            <a:pPr lvl="0">
+              <a:defRPr sz="1800"/>
+            </a:pPr>
+            <a:r>
+              <a:rPr sz="3600"/>
+              <a:t>Applications at commit 9df8110.</a:t>
+            </a:r>
+          </a:p>
+        </p:txBody>
+      </p:sp>
+      <p:graphicFrame>
+        <p:nvGraphicFramePr>
+          <p:cNvPr id="96" name="Table 96"/>
+          <p:cNvGraphicFramePr/>
+          <p:nvPr/>
+        </p:nvGraphicFramePr>
+        <p:xfrm>
+          <a:off x="6582893" y="3146047"/>
+          <a:ext cx="5899915" cy="5715001"/>
+        </p:xfrm>
+        <a:graphic xmlns:a="http://schemas.openxmlformats.org/drawingml/2006/main">
+          <a:graphicData uri="http://schemas.openxmlformats.org/drawingml/2006/table">
+            <a:tbl>
+              <a:tblPr firstCol="0" firstRow="0" lastCol="0" lastRow="0" bandCol="0" bandRow="1" rtl="0">
+                <a:tableStyleId>{4C3C2611-4C71-4FC5-86AE-919BDF0F9419}</a:tableStyleId>
+              </a:tblPr>
+              <a:tblGrid>
+                <a:gridCol w="1491353"/>
+                <a:gridCol w="1535130"/>
+                <a:gridCol w="1181100"/>
+                <a:gridCol w="1692329"/>
+              </a:tblGrid>
+              <a:tr h="816428">
+                <a:tc>
+                  <a:txBody>
+                    <a:bodyPr/>
+                    <a:lstStyle/>
+                    <a:p>
+                      <a:pPr lvl="0" algn="l" defTabSz="914400"/>
+                      <a:r>
+                        <a:rPr b="1" sz="1600">
+                          <a:solidFill>
+                            <a:srgbClr val="323333"/>
+                          </a:solidFill>
+                          <a:latin typeface="Helvetica Neue"/>
+                          <a:ea typeface="Helvetica Neue"/>
+                          <a:cs typeface="Helvetica Neue"/>
+                          <a:sym typeface="Helvetica Neue"/>
+                        </a:rPr>
+                        <a:t>Framework</a:t>
+                      </a:r>
+                    </a:p>
+                  </a:txBody>
+                  <a:tcPr marL="165100" marR="165100" marT="76200" marB="76200" anchor="ctr" anchorCtr="0" horzOverflow="overflow">
+                    <a:lnL w="12700">
+                      <a:solidFill>
+                        <a:srgbClr val="DDDDDD"/>
+                      </a:solidFill>
+                      <a:miter lim="400000"/>
+                    </a:lnL>
+                    <a:lnR w="12700">
+                      <a:solidFill>
+                        <a:srgbClr val="DDDDDD"/>
+                      </a:solidFill>
+                      <a:miter lim="400000"/>
+                    </a:lnR>
+                    <a:lnT w="12700">
+                      <a:solidFill>
+                        <a:srgbClr val="DDDDDD"/>
+                      </a:solidFill>
+                      <a:miter lim="400000"/>
+                    </a:lnT>
+                    <a:lnB w="12700">
+                      <a:solidFill>
+                        <a:srgbClr val="DDDDDD"/>
+                      </a:solidFill>
+                      <a:miter lim="400000"/>
+                    </a:lnB>
+                  </a:tcPr>
+                </a:tc>
+                <a:tc>
+                  <a:txBody>
+                    <a:bodyPr/>
+                    <a:lstStyle/>
+                    <a:p>
+                      <a:pPr lvl="0" algn="l" defTabSz="914400"/>
+                      <a:r>
+                        <a:rPr b="1" sz="1600">
+                          <a:solidFill>
+                            <a:srgbClr val="323333"/>
+                          </a:solidFill>
+                          <a:latin typeface="Helvetica Neue"/>
+                          <a:ea typeface="Helvetica Neue"/>
+                          <a:cs typeface="Helvetica Neue"/>
+                          <a:sym typeface="Helvetica Neue"/>
+                        </a:rPr>
+                        <a:t>Throughput (req/s)</a:t>
+                      </a:r>
+                    </a:p>
+                  </a:txBody>
+                  <a:tcPr marL="165100" marR="165100" marT="76200" marB="76200" anchor="ctr" anchorCtr="0" horzOverflow="overflow">
+                    <a:lnL w="12700">
+                      <a:solidFill>
+                        <a:srgbClr val="DDDDDD"/>
+                      </a:solidFill>
+                      <a:miter lim="400000"/>
+                    </a:lnL>
+                    <a:lnR w="12700">
+                      <a:solidFill>
+                        <a:srgbClr val="DDDDDD"/>
+                      </a:solidFill>
+                      <a:miter lim="400000"/>
+                    </a:lnR>
+                    <a:lnT w="12700">
+                      <a:solidFill>
+                        <a:srgbClr val="DDDDDD"/>
+                      </a:solidFill>
+                      <a:miter lim="400000"/>
+                    </a:lnT>
+                    <a:lnB w="12700">
+                      <a:solidFill>
+                        <a:srgbClr val="DDDDDD"/>
+                      </a:solidFill>
+                      <a:miter lim="400000"/>
+                    </a:lnB>
+                  </a:tcPr>
+                </a:tc>
+                <a:tc>
+                  <a:txBody>
+                    <a:bodyPr/>
+                    <a:lstStyle/>
+                    <a:p>
+                      <a:pPr lvl="0" algn="l" defTabSz="914400"/>
+                      <a:r>
+                        <a:rPr b="1" sz="1600">
+                          <a:solidFill>
+                            <a:srgbClr val="323333"/>
+                          </a:solidFill>
+                          <a:latin typeface="Helvetica Neue"/>
+                          <a:ea typeface="Helvetica Neue"/>
+                          <a:cs typeface="Helvetica Neue"/>
+                          <a:sym typeface="Helvetica Neue"/>
+                        </a:rPr>
+                        <a:t>Latency (ms)</a:t>
+                      </a:r>
+                    </a:p>
+                  </a:txBody>
+                  <a:tcPr marL="165100" marR="165100" marT="76200" marB="76200" anchor="ctr" anchorCtr="0" horzOverflow="overflow">
+                    <a:lnL w="12700">
+                      <a:solidFill>
+                        <a:srgbClr val="DDDDDD"/>
+                      </a:solidFill>
+                      <a:miter lim="400000"/>
+                    </a:lnL>
+                    <a:lnR w="12700">
+                      <a:solidFill>
+                        <a:srgbClr val="DDDDDD"/>
+                      </a:solidFill>
+                      <a:miter lim="400000"/>
+                    </a:lnR>
+                    <a:lnT w="12700">
+                      <a:solidFill>
+                        <a:srgbClr val="DDDDDD"/>
+                      </a:solidFill>
+                      <a:miter lim="400000"/>
+                    </a:lnT>
+                    <a:lnB w="12700">
+                      <a:solidFill>
+                        <a:srgbClr val="DDDDDD"/>
+                      </a:solidFill>
+                      <a:miter lim="400000"/>
+                    </a:lnB>
+                  </a:tcPr>
+                </a:tc>
+                <a:tc>
+                  <a:txBody>
+                    <a:bodyPr/>
+                    <a:lstStyle/>
+                    <a:p>
+                      <a:pPr lvl="0" algn="l" defTabSz="914400"/>
+                      <a:r>
+                        <a:rPr b="1" sz="1600">
+                          <a:solidFill>
+                            <a:srgbClr val="323333"/>
+                          </a:solidFill>
+                          <a:latin typeface="Helvetica Neue"/>
+                          <a:ea typeface="Helvetica Neue"/>
+                          <a:cs typeface="Helvetica Neue"/>
+                          <a:sym typeface="Helvetica Neue"/>
+                        </a:rPr>
+                        <a:t>Consistency (σ ms)</a:t>
+                      </a:r>
+                    </a:p>
+                  </a:txBody>
+                  <a:tcPr marL="165100" marR="165100" marT="76200" marB="76200" anchor="ctr" anchorCtr="0" horzOverflow="overflow">
+                    <a:lnL w="12700">
+                      <a:solidFill>
+                        <a:srgbClr val="DDDDDD"/>
+                      </a:solidFill>
+                      <a:miter lim="400000"/>
+                    </a:lnL>
+                    <a:lnR w="12700">
+                      <a:solidFill>
+                        <a:srgbClr val="DDDDDD"/>
+                      </a:solidFill>
+                      <a:miter lim="400000"/>
+                    </a:lnR>
+                    <a:lnT w="12700">
+                      <a:solidFill>
+                        <a:srgbClr val="DDDDDD"/>
+                      </a:solidFill>
+                      <a:miter lim="400000"/>
+                    </a:lnT>
+                    <a:lnB w="12700">
+                      <a:solidFill>
+                        <a:srgbClr val="DDDDDD"/>
+                      </a:solidFill>
+                      <a:miter lim="400000"/>
+                    </a:lnB>
+                  </a:tcPr>
+                </a:tc>
+              </a:tr>
+              <a:tr h="816428">
+                <a:tc>
+                  <a:txBody>
+                    <a:bodyPr/>
+                    <a:lstStyle/>
+                    <a:p>
+                      <a:pPr lvl="0" algn="l" defTabSz="914400"/>
+                      <a:r>
+                        <a:rPr sz="1600">
+                          <a:solidFill>
+                            <a:srgbClr val="323333"/>
+                          </a:solidFill>
+                          <a:latin typeface="Helvetica Neue"/>
+                          <a:ea typeface="Helvetica Neue"/>
+                          <a:cs typeface="Helvetica Neue"/>
+                          <a:sym typeface="Helvetica Neue"/>
+                        </a:rPr>
+                        <a:t>Phoenix</a:t>
+                      </a:r>
+                    </a:p>
+                  </a:txBody>
+                  <a:tcPr marL="165100" marR="165100" marT="76200" marB="76200" anchor="ctr" anchorCtr="0" horzOverflow="overflow">
+                    <a:lnL w="12700">
+                      <a:solidFill>
+                        <a:srgbClr val="DDDDDD"/>
+                      </a:solidFill>
+                      <a:miter lim="400000"/>
+                    </a:lnL>
+                    <a:lnR w="12700">
+                      <a:solidFill>
+                        <a:srgbClr val="DDDDDD"/>
+                      </a:solidFill>
+                      <a:miter lim="400000"/>
+                    </a:lnR>
+                    <a:lnT w="12700">
+                      <a:solidFill>
+                        <a:srgbClr val="DDDDDD"/>
+                      </a:solidFill>
+                      <a:miter lim="400000"/>
+                    </a:lnT>
+                    <a:lnB w="12700">
+                      <a:solidFill>
+                        <a:srgbClr val="DDDDDD"/>
+                      </a:solidFill>
+                      <a:miter lim="400000"/>
+                    </a:lnB>
+                  </a:tcPr>
+                </a:tc>
+                <a:tc>
+                  <a:txBody>
+                    <a:bodyPr/>
+                    <a:lstStyle/>
+                    <a:p>
+                      <a:pPr lvl="0" algn="l" defTabSz="914400"/>
+                      <a:r>
+                        <a:rPr sz="1600">
+                          <a:solidFill>
+                            <a:srgbClr val="323333"/>
+                          </a:solidFill>
+                          <a:latin typeface="Helvetica Neue"/>
+                          <a:ea typeface="Helvetica Neue"/>
+                          <a:cs typeface="Helvetica Neue"/>
+                          <a:sym typeface="Helvetica Neue"/>
+                        </a:rPr>
+                        <a:t>22294.75</a:t>
+                      </a:r>
+                    </a:p>
+                  </a:txBody>
+                  <a:tcPr marL="165100" marR="165100" marT="76200" marB="76200" anchor="ctr" anchorCtr="0" horzOverflow="overflow">
+                    <a:lnL w="12700">
+                      <a:solidFill>
+                        <a:srgbClr val="DDDDDD"/>
+                      </a:solidFill>
+                      <a:miter lim="400000"/>
+                    </a:lnL>
+                    <a:lnR w="12700">
+                      <a:solidFill>
+                        <a:srgbClr val="DDDDDD"/>
+                      </a:solidFill>
+                      <a:miter lim="400000"/>
+                    </a:lnR>
+                    <a:lnT w="12700">
+                      <a:solidFill>
+                        <a:srgbClr val="DDDDDD"/>
+                      </a:solidFill>
+                      <a:miter lim="400000"/>
+                    </a:lnT>
+                    <a:lnB w="12700">
+                      <a:solidFill>
+                        <a:srgbClr val="DDDDDD"/>
+                      </a:solidFill>
+                      <a:miter lim="400000"/>
+                    </a:lnB>
+                  </a:tcPr>
+                </a:tc>
+                <a:tc>
+                  <a:txBody>
+                    <a:bodyPr/>
+                    <a:lstStyle/>
+                    <a:p>
+                      <a:pPr lvl="0" algn="l" defTabSz="914400"/>
+                      <a:r>
+                        <a:rPr sz="1600">
+                          <a:solidFill>
+                            <a:srgbClr val="323333"/>
+                          </a:solidFill>
+                          <a:latin typeface="Helvetica Neue"/>
+                          <a:ea typeface="Helvetica Neue"/>
+                          <a:cs typeface="Helvetica Neue"/>
+                          <a:sym typeface="Helvetica Neue"/>
+                        </a:rPr>
+                        <a:t>4.54</a:t>
+                      </a:r>
+                    </a:p>
+                  </a:txBody>
+                  <a:tcPr marL="165100" marR="165100" marT="76200" marB="76200" anchor="ctr" anchorCtr="0" horzOverflow="overflow">
+                    <a:lnL w="12700">
+                      <a:solidFill>
+                        <a:srgbClr val="DDDDDD"/>
+                      </a:solidFill>
+                      <a:miter lim="400000"/>
+                    </a:lnL>
+                    <a:lnR w="12700">
+                      <a:solidFill>
+                        <a:srgbClr val="DDDDDD"/>
+                      </a:solidFill>
+                      <a:miter lim="400000"/>
+                    </a:lnR>
+                    <a:lnT w="12700">
+                      <a:solidFill>
+                        <a:srgbClr val="DDDDDD"/>
+                      </a:solidFill>
+                      <a:miter lim="400000"/>
+                    </a:lnT>
+                    <a:lnB w="12700">
+                      <a:solidFill>
+                        <a:srgbClr val="DDDDDD"/>
+                      </a:solidFill>
+                      <a:miter lim="400000"/>
+                    </a:lnB>
+                  </a:tcPr>
+                </a:tc>
+                <a:tc>
+                  <a:txBody>
+                    <a:bodyPr/>
+                    <a:lstStyle/>
+                    <a:p>
+                      <a:pPr lvl="0" algn="l" defTabSz="914400"/>
+                      <a:r>
+                        <a:rPr sz="1600">
+                          <a:solidFill>
+                            <a:srgbClr val="323333"/>
+                          </a:solidFill>
+                          <a:latin typeface="Helvetica Neue"/>
+                          <a:ea typeface="Helvetica Neue"/>
+                          <a:cs typeface="Helvetica Neue"/>
+                          <a:sym typeface="Helvetica Neue"/>
+                        </a:rPr>
+                        <a:t>1.75</a:t>
+                      </a:r>
+                    </a:p>
+                  </a:txBody>
+                  <a:tcPr marL="165100" marR="165100" marT="76200" marB="76200" anchor="ctr" anchorCtr="0" horzOverflow="overflow">
+                    <a:lnL w="12700">
+                      <a:solidFill>
+                        <a:srgbClr val="DDDDDD"/>
+                      </a:solidFill>
+                      <a:miter lim="400000"/>
+                    </a:lnL>
+                    <a:lnR w="12700">
+                      <a:solidFill>
+                        <a:srgbClr val="DDDDDD"/>
+                      </a:solidFill>
+                      <a:miter lim="400000"/>
+                    </a:lnR>
+                    <a:lnT w="12700">
+                      <a:solidFill>
+                        <a:srgbClr val="DDDDDD"/>
+                      </a:solidFill>
+                      <a:miter lim="400000"/>
+                    </a:lnT>
+                    <a:lnB w="12700">
+                      <a:solidFill>
+                        <a:srgbClr val="DDDDDD"/>
+                      </a:solidFill>
+                      <a:miter lim="400000"/>
+                    </a:lnB>
+                  </a:tcPr>
+                </a:tc>
+              </a:tr>
+              <a:tr h="816428">
+                <a:tc>
+                  <a:txBody>
+                    <a:bodyPr/>
+                    <a:lstStyle/>
+                    <a:p>
+                      <a:pPr lvl="0" algn="l" defTabSz="914400"/>
+                      <a:r>
+                        <a:rPr sz="1600">
+                          <a:solidFill>
+                            <a:srgbClr val="323333"/>
+                          </a:solidFill>
+                          <a:latin typeface="Helvetica Neue"/>
+                          <a:ea typeface="Helvetica Neue"/>
+                          <a:cs typeface="Helvetica Neue"/>
+                          <a:sym typeface="Helvetica Neue"/>
+                        </a:rPr>
+                        <a:t>Express Cluster</a:t>
+                      </a:r>
+                    </a:p>
+                  </a:txBody>
+                  <a:tcPr marL="165100" marR="165100" marT="76200" marB="76200" anchor="ctr" anchorCtr="0" horzOverflow="overflow">
+                    <a:lnL w="12700">
+                      <a:solidFill>
+                        <a:srgbClr val="DDDDDD"/>
+                      </a:solidFill>
+                      <a:miter lim="400000"/>
+                    </a:lnL>
+                    <a:lnR w="12700">
+                      <a:solidFill>
+                        <a:srgbClr val="DDDDDD"/>
+                      </a:solidFill>
+                      <a:miter lim="400000"/>
+                    </a:lnR>
+                    <a:lnT w="12700">
+                      <a:solidFill>
+                        <a:srgbClr val="DDDDDD"/>
+                      </a:solidFill>
+                      <a:miter lim="400000"/>
+                    </a:lnT>
+                    <a:lnB w="12700">
+                      <a:solidFill>
+                        <a:srgbClr val="DDDDDD"/>
+                      </a:solidFill>
+                      <a:miter lim="400000"/>
+                    </a:lnB>
+                    <a:solidFill>
+                      <a:srgbClr val="F8F8F8"/>
+                    </a:solidFill>
+                  </a:tcPr>
+                </a:tc>
+                <a:tc>
+                  <a:txBody>
+                    <a:bodyPr/>
+                    <a:lstStyle/>
+                    <a:p>
+                      <a:pPr lvl="0" algn="l" defTabSz="914400"/>
+                      <a:r>
+                        <a:rPr sz="1600">
+                          <a:solidFill>
+                            <a:srgbClr val="323333"/>
+                          </a:solidFill>
+                          <a:latin typeface="Helvetica Neue"/>
+                          <a:ea typeface="Helvetica Neue"/>
+                          <a:cs typeface="Helvetica Neue"/>
+                          <a:sym typeface="Helvetica Neue"/>
+                        </a:rPr>
+                        <a:t>18427.80</a:t>
+                      </a:r>
+                    </a:p>
+                  </a:txBody>
+                  <a:tcPr marL="165100" marR="165100" marT="76200" marB="76200" anchor="ctr" anchorCtr="0" horzOverflow="overflow">
+                    <a:lnL w="12700">
+                      <a:solidFill>
+                        <a:srgbClr val="DDDDDD"/>
+                      </a:solidFill>
+                      <a:miter lim="400000"/>
+                    </a:lnL>
+                    <a:lnR w="12700">
+                      <a:solidFill>
+                        <a:srgbClr val="DDDDDD"/>
+                      </a:solidFill>
+                      <a:miter lim="400000"/>
+                    </a:lnR>
+                    <a:lnT w="12700">
+                      <a:solidFill>
+                        <a:srgbClr val="DDDDDD"/>
+                      </a:solidFill>
+                      <a:miter lim="400000"/>
+                    </a:lnT>
+                    <a:lnB w="12700">
+                      <a:solidFill>
+                        <a:srgbClr val="DDDDDD"/>
+                      </a:solidFill>
+                      <a:miter lim="400000"/>
+                    </a:lnB>
+                    <a:solidFill>
+                      <a:srgbClr val="F8F8F8"/>
+                    </a:solidFill>
+                  </a:tcPr>
+                </a:tc>
+                <a:tc>
+                  <a:txBody>
+                    <a:bodyPr/>
+                    <a:lstStyle/>
+                    <a:p>
+                      <a:pPr lvl="0" algn="l" defTabSz="914400"/>
+                      <a:r>
+                        <a:rPr sz="1600">
+                          <a:solidFill>
+                            <a:srgbClr val="323333"/>
+                          </a:solidFill>
+                          <a:latin typeface="Helvetica Neue"/>
+                          <a:ea typeface="Helvetica Neue"/>
+                          <a:cs typeface="Helvetica Neue"/>
+                          <a:sym typeface="Helvetica Neue"/>
+                        </a:rPr>
+                        <a:t>6.62</a:t>
+                      </a:r>
+                    </a:p>
+                  </a:txBody>
+                  <a:tcPr marL="165100" marR="165100" marT="76200" marB="76200" anchor="ctr" anchorCtr="0" horzOverflow="overflow">
+                    <a:lnL w="12700">
+                      <a:solidFill>
+                        <a:srgbClr val="DDDDDD"/>
+                      </a:solidFill>
+                      <a:miter lim="400000"/>
+                    </a:lnL>
+                    <a:lnR w="12700">
+                      <a:solidFill>
+                        <a:srgbClr val="DDDDDD"/>
+                      </a:solidFill>
+                      <a:miter lim="400000"/>
+                    </a:lnR>
+                    <a:lnT w="12700">
+                      <a:solidFill>
+                        <a:srgbClr val="DDDDDD"/>
+                      </a:solidFill>
+                      <a:miter lim="400000"/>
+                    </a:lnT>
+                    <a:lnB w="12700">
+                      <a:solidFill>
+                        <a:srgbClr val="DDDDDD"/>
+                      </a:solidFill>
+                      <a:miter lim="400000"/>
+                    </a:lnB>
+                    <a:solidFill>
+                      <a:srgbClr val="F8F8F8"/>
+                    </a:solidFill>
+                  </a:tcPr>
+                </a:tc>
+                <a:tc>
+                  <a:txBody>
+                    <a:bodyPr/>
+                    <a:lstStyle/>
+                    <a:p>
+                      <a:pPr lvl="0" algn="l" defTabSz="914400"/>
+                      <a:r>
+                        <a:rPr sz="1600">
+                          <a:solidFill>
+                            <a:srgbClr val="323333"/>
+                          </a:solidFill>
+                          <a:latin typeface="Helvetica Neue"/>
+                          <a:ea typeface="Helvetica Neue"/>
+                          <a:cs typeface="Helvetica Neue"/>
+                          <a:sym typeface="Helvetica Neue"/>
+                        </a:rPr>
+                        <a:t>7.26</a:t>
+                      </a:r>
+                    </a:p>
+                  </a:txBody>
+                  <a:tcPr marL="165100" marR="165100" marT="76200" marB="76200" anchor="ctr" anchorCtr="0" horzOverflow="overflow">
+                    <a:lnL w="12700">
+                      <a:solidFill>
+                        <a:srgbClr val="DDDDDD"/>
+                      </a:solidFill>
+                      <a:miter lim="400000"/>
+                    </a:lnL>
+                    <a:lnR w="12700">
+                      <a:solidFill>
+                        <a:srgbClr val="DDDDDD"/>
+                      </a:solidFill>
+                      <a:miter lim="400000"/>
+                    </a:lnR>
+                    <a:lnT w="12700">
+                      <a:solidFill>
+                        <a:srgbClr val="DDDDDD"/>
+                      </a:solidFill>
+                      <a:miter lim="400000"/>
+                    </a:lnT>
+                    <a:lnB w="12700">
+                      <a:solidFill>
+                        <a:srgbClr val="DDDDDD"/>
+                      </a:solidFill>
+                      <a:miter lim="400000"/>
+                    </a:lnB>
+                    <a:solidFill>
+                      <a:srgbClr val="F8F8F8"/>
+                    </a:solidFill>
+                  </a:tcPr>
+                </a:tc>
+              </a:tr>
+              <a:tr h="816428">
+                <a:tc>
+                  <a:txBody>
+                    <a:bodyPr/>
+                    <a:lstStyle/>
+                    <a:p>
+                      <a:pPr lvl="0" algn="l" defTabSz="914400"/>
+                      <a:r>
+                        <a:rPr sz="1600">
+                          <a:solidFill>
+                            <a:srgbClr val="323333"/>
+                          </a:solidFill>
+                          <a:latin typeface="Helvetica Neue"/>
+                          <a:ea typeface="Helvetica Neue"/>
+                          <a:cs typeface="Helvetica Neue"/>
+                          <a:sym typeface="Helvetica Neue"/>
+                        </a:rPr>
+                        <a:t>Martini</a:t>
+                      </a:r>
+                    </a:p>
+                  </a:txBody>
+                  <a:tcPr marL="165100" marR="165100" marT="76200" marB="76200" anchor="ctr" anchorCtr="0" horzOverflow="overflow">
+                    <a:lnL w="12700">
+                      <a:solidFill>
+                        <a:srgbClr val="DDDDDD"/>
+                      </a:solidFill>
+                      <a:miter lim="400000"/>
+                    </a:lnL>
+                    <a:lnR w="12700">
+                      <a:solidFill>
+                        <a:srgbClr val="DDDDDD"/>
+                      </a:solidFill>
+                      <a:miter lim="400000"/>
+                    </a:lnR>
+                    <a:lnT w="12700">
+                      <a:solidFill>
+                        <a:srgbClr val="DDDDDD"/>
+                      </a:solidFill>
+                      <a:miter lim="400000"/>
+                    </a:lnT>
+                    <a:lnB w="12700">
+                      <a:solidFill>
+                        <a:srgbClr val="DDDDDD"/>
+                      </a:solidFill>
+                      <a:miter lim="400000"/>
+                    </a:lnB>
+                  </a:tcPr>
+                </a:tc>
+                <a:tc>
+                  <a:txBody>
+                    <a:bodyPr/>
+                    <a:lstStyle/>
+                    <a:p>
+                      <a:pPr lvl="0" algn="l" defTabSz="914400"/>
+                      <a:r>
+                        <a:rPr sz="1600">
+                          <a:solidFill>
+                            <a:srgbClr val="323333"/>
+                          </a:solidFill>
+                          <a:latin typeface="Helvetica Neue"/>
+                          <a:ea typeface="Helvetica Neue"/>
+                          <a:cs typeface="Helvetica Neue"/>
+                          <a:sym typeface="Helvetica Neue"/>
+                        </a:rPr>
+                        <a:t>13148.48</a:t>
+                      </a:r>
+                    </a:p>
+                  </a:txBody>
+                  <a:tcPr marL="165100" marR="165100" marT="76200" marB="76200" anchor="ctr" anchorCtr="0" horzOverflow="overflow">
+                    <a:lnL w="12700">
+                      <a:solidFill>
+                        <a:srgbClr val="DDDDDD"/>
+                      </a:solidFill>
+                      <a:miter lim="400000"/>
+                    </a:lnL>
+                    <a:lnR w="12700">
+                      <a:solidFill>
+                        <a:srgbClr val="DDDDDD"/>
+                      </a:solidFill>
+                      <a:miter lim="400000"/>
+                    </a:lnR>
+                    <a:lnT w="12700">
+                      <a:solidFill>
+                        <a:srgbClr val="DDDDDD"/>
+                      </a:solidFill>
+                      <a:miter lim="400000"/>
+                    </a:lnT>
+                    <a:lnB w="12700">
+                      <a:solidFill>
+                        <a:srgbClr val="DDDDDD"/>
+                      </a:solidFill>
+                      <a:miter lim="400000"/>
+                    </a:lnB>
+                  </a:tcPr>
+                </a:tc>
+                <a:tc>
+                  <a:txBody>
+                    <a:bodyPr/>
+                    <a:lstStyle/>
+                    <a:p>
+                      <a:pPr lvl="0" algn="l" defTabSz="914400"/>
+                      <a:r>
+                        <a:rPr sz="1600">
+                          <a:solidFill>
+                            <a:srgbClr val="323333"/>
+                          </a:solidFill>
+                          <a:latin typeface="Helvetica Neue"/>
+                          <a:ea typeface="Helvetica Neue"/>
+                          <a:cs typeface="Helvetica Neue"/>
+                          <a:sym typeface="Helvetica Neue"/>
+                        </a:rPr>
+                        <a:t>7.62</a:t>
+                      </a:r>
+                    </a:p>
+                  </a:txBody>
+                  <a:tcPr marL="165100" marR="165100" marT="76200" marB="76200" anchor="ctr" anchorCtr="0" horzOverflow="overflow">
+                    <a:lnL w="12700">
+                      <a:solidFill>
+                        <a:srgbClr val="DDDDDD"/>
+                      </a:solidFill>
+                      <a:miter lim="400000"/>
+                    </a:lnL>
+                    <a:lnR w="12700">
+                      <a:solidFill>
+                        <a:srgbClr val="DDDDDD"/>
+                      </a:solidFill>
+                      <a:miter lim="400000"/>
+                    </a:lnR>
+                    <a:lnT w="12700">
+                      <a:solidFill>
+                        <a:srgbClr val="DDDDDD"/>
+                      </a:solidFill>
+                      <a:miter lim="400000"/>
+                    </a:lnT>
+                    <a:lnB w="12700">
+                      <a:solidFill>
+                        <a:srgbClr val="DDDDDD"/>
+                      </a:solidFill>
+                      <a:miter lim="400000"/>
+                    </a:lnB>
+                  </a:tcPr>
+                </a:tc>
+                <a:tc>
+                  <a:txBody>
+                    <a:bodyPr/>
+                    <a:lstStyle/>
+                    <a:p>
+                      <a:pPr lvl="0" algn="l" defTabSz="914400"/>
+                      <a:r>
+                        <a:rPr sz="1600">
+                          <a:solidFill>
+                            <a:srgbClr val="323333"/>
+                          </a:solidFill>
+                          <a:latin typeface="Helvetica Neue"/>
+                          <a:ea typeface="Helvetica Neue"/>
+                          <a:cs typeface="Helvetica Neue"/>
+                          <a:sym typeface="Helvetica Neue"/>
+                        </a:rPr>
+                        <a:t>3.84</a:t>
+                      </a:r>
+                    </a:p>
+                  </a:txBody>
+                  <a:tcPr marL="165100" marR="165100" marT="76200" marB="76200" anchor="ctr" anchorCtr="0" horzOverflow="overflow">
+                    <a:lnL w="12700">
+                      <a:solidFill>
+                        <a:srgbClr val="DDDDDD"/>
+                      </a:solidFill>
+                      <a:miter lim="400000"/>
+                    </a:lnL>
+                    <a:lnR w="12700">
+                      <a:solidFill>
+                        <a:srgbClr val="DDDDDD"/>
+                      </a:solidFill>
+                      <a:miter lim="400000"/>
+                    </a:lnR>
+                    <a:lnT w="12700">
+                      <a:solidFill>
+                        <a:srgbClr val="DDDDDD"/>
+                      </a:solidFill>
+                      <a:miter lim="400000"/>
+                    </a:lnT>
+                    <a:lnB w="12700">
+                      <a:solidFill>
+                        <a:srgbClr val="DDDDDD"/>
+                      </a:solidFill>
+                      <a:miter lim="400000"/>
+                    </a:lnB>
+                  </a:tcPr>
+                </a:tc>
+              </a:tr>
+              <a:tr h="816428">
+                <a:tc>
+                  <a:txBody>
+                    <a:bodyPr/>
+                    <a:lstStyle/>
+                    <a:p>
+                      <a:pPr lvl="0" algn="l" defTabSz="914400"/>
+                      <a:r>
+                        <a:rPr sz="1600">
+                          <a:solidFill>
+                            <a:srgbClr val="323333"/>
+                          </a:solidFill>
+                          <a:latin typeface="Helvetica Neue"/>
+                          <a:ea typeface="Helvetica Neue"/>
+                          <a:cs typeface="Helvetica Neue"/>
+                          <a:sym typeface="Helvetica Neue"/>
+                        </a:rPr>
+                        <a:t>Sinatra</a:t>
+                      </a:r>
+                    </a:p>
+                  </a:txBody>
+                  <a:tcPr marL="165100" marR="165100" marT="76200" marB="76200" anchor="ctr" anchorCtr="0" horzOverflow="overflow">
+                    <a:lnL w="12700">
+                      <a:solidFill>
+                        <a:srgbClr val="DDDDDD"/>
+                      </a:solidFill>
+                      <a:miter lim="400000"/>
+                    </a:lnL>
+                    <a:lnR w="12700">
+                      <a:solidFill>
+                        <a:srgbClr val="DDDDDD"/>
+                      </a:solidFill>
+                      <a:miter lim="400000"/>
+                    </a:lnR>
+                    <a:lnT w="12700">
+                      <a:solidFill>
+                        <a:srgbClr val="DDDDDD"/>
+                      </a:solidFill>
+                      <a:miter lim="400000"/>
+                    </a:lnT>
+                    <a:lnB w="12700">
+                      <a:solidFill>
+                        <a:srgbClr val="DDDDDD"/>
+                      </a:solidFill>
+                      <a:miter lim="400000"/>
+                    </a:lnB>
+                    <a:solidFill>
+                      <a:srgbClr val="F8F8F8"/>
+                    </a:solidFill>
+                  </a:tcPr>
+                </a:tc>
+                <a:tc>
+                  <a:txBody>
+                    <a:bodyPr/>
+                    <a:lstStyle/>
+                    <a:p>
+                      <a:pPr lvl="0" algn="l" defTabSz="914400"/>
+                      <a:r>
+                        <a:rPr sz="1600">
+                          <a:solidFill>
+                            <a:srgbClr val="323333"/>
+                          </a:solidFill>
+                          <a:latin typeface="Helvetica Neue"/>
+                          <a:ea typeface="Helvetica Neue"/>
+                          <a:cs typeface="Helvetica Neue"/>
+                          <a:sym typeface="Helvetica Neue"/>
+                        </a:rPr>
+                        <a:t>6657.98</a:t>
+                      </a:r>
+                    </a:p>
+                  </a:txBody>
+                  <a:tcPr marL="165100" marR="165100" marT="76200" marB="76200" anchor="ctr" anchorCtr="0" horzOverflow="overflow">
+                    <a:lnL w="12700">
+                      <a:solidFill>
+                        <a:srgbClr val="DDDDDD"/>
+                      </a:solidFill>
+                      <a:miter lim="400000"/>
+                    </a:lnL>
+                    <a:lnR w="12700">
+                      <a:solidFill>
+                        <a:srgbClr val="DDDDDD"/>
+                      </a:solidFill>
+                      <a:miter lim="400000"/>
+                    </a:lnR>
+                    <a:lnT w="12700">
+                      <a:solidFill>
+                        <a:srgbClr val="DDDDDD"/>
+                      </a:solidFill>
+                      <a:miter lim="400000"/>
+                    </a:lnT>
+                    <a:lnB w="12700">
+                      <a:solidFill>
+                        <a:srgbClr val="DDDDDD"/>
+                      </a:solidFill>
+                      <a:miter lim="400000"/>
+                    </a:lnB>
+                    <a:solidFill>
+                      <a:srgbClr val="F8F8F8"/>
+                    </a:solidFill>
+                  </a:tcPr>
+                </a:tc>
+                <a:tc>
+                  <a:txBody>
+                    <a:bodyPr/>
+                    <a:lstStyle/>
+                    <a:p>
+                      <a:pPr lvl="0" algn="l" defTabSz="914400"/>
+                      <a:r>
+                        <a:rPr sz="1600">
+                          <a:solidFill>
+                            <a:srgbClr val="323333"/>
+                          </a:solidFill>
+                          <a:latin typeface="Helvetica Neue"/>
+                          <a:ea typeface="Helvetica Neue"/>
+                          <a:cs typeface="Helvetica Neue"/>
+                          <a:sym typeface="Helvetica Neue"/>
+                        </a:rPr>
+                        <a:t>8.80</a:t>
+                      </a:r>
+                    </a:p>
+                  </a:txBody>
+                  <a:tcPr marL="165100" marR="165100" marT="76200" marB="76200" anchor="ctr" anchorCtr="0" horzOverflow="overflow">
+                    <a:lnL w="12700">
+                      <a:solidFill>
+                        <a:srgbClr val="DDDDDD"/>
+                      </a:solidFill>
+                      <a:miter lim="400000"/>
+                    </a:lnL>
+                    <a:lnR w="12700">
+                      <a:solidFill>
+                        <a:srgbClr val="DDDDDD"/>
+                      </a:solidFill>
+                      <a:miter lim="400000"/>
+                    </a:lnR>
+                    <a:lnT w="12700">
+                      <a:solidFill>
+                        <a:srgbClr val="DDDDDD"/>
+                      </a:solidFill>
+                      <a:miter lim="400000"/>
+                    </a:lnT>
+                    <a:lnB w="12700">
+                      <a:solidFill>
+                        <a:srgbClr val="DDDDDD"/>
+                      </a:solidFill>
+                      <a:miter lim="400000"/>
+                    </a:lnB>
+                    <a:solidFill>
+                      <a:srgbClr val="F8F8F8"/>
+                    </a:solidFill>
+                  </a:tcPr>
+                </a:tc>
+                <a:tc>
+                  <a:txBody>
+                    <a:bodyPr/>
+                    <a:lstStyle/>
+                    <a:p>
+                      <a:pPr lvl="0" algn="l" defTabSz="914400"/>
+                      <a:r>
+                        <a:rPr sz="1600">
+                          <a:solidFill>
+                            <a:srgbClr val="323333"/>
+                          </a:solidFill>
+                          <a:latin typeface="Helvetica Neue"/>
+                          <a:ea typeface="Helvetica Neue"/>
+                          <a:cs typeface="Helvetica Neue"/>
+                          <a:sym typeface="Helvetica Neue"/>
+                        </a:rPr>
+                        <a:t>4.16</a:t>
+                      </a:r>
+                    </a:p>
+                  </a:txBody>
+                  <a:tcPr marL="165100" marR="165100" marT="76200" marB="76200" anchor="ctr" anchorCtr="0" horzOverflow="overflow">
+                    <a:lnL w="12700">
+                      <a:solidFill>
+                        <a:srgbClr val="DDDDDD"/>
+                      </a:solidFill>
+                      <a:miter lim="400000"/>
+                    </a:lnL>
+                    <a:lnR w="12700">
+                      <a:solidFill>
+                        <a:srgbClr val="DDDDDD"/>
+                      </a:solidFill>
+                      <a:miter lim="400000"/>
+                    </a:lnR>
+                    <a:lnT w="12700">
+                      <a:solidFill>
+                        <a:srgbClr val="DDDDDD"/>
+                      </a:solidFill>
+                      <a:miter lim="400000"/>
+                    </a:lnT>
+                    <a:lnB w="12700">
+                      <a:solidFill>
+                        <a:srgbClr val="DDDDDD"/>
+                      </a:solidFill>
+                      <a:miter lim="400000"/>
+                    </a:lnB>
+                    <a:solidFill>
+                      <a:srgbClr val="F8F8F8"/>
+                    </a:solidFill>
+                  </a:tcPr>
+                </a:tc>
+              </a:tr>
+              <a:tr h="816428">
+                <a:tc>
+                  <a:txBody>
+                    <a:bodyPr/>
+                    <a:lstStyle/>
+                    <a:p>
+                      <a:pPr lvl="0" algn="l" defTabSz="914400"/>
+                      <a:r>
+                        <a:rPr sz="1600">
+                          <a:solidFill>
+                            <a:srgbClr val="323333"/>
+                          </a:solidFill>
+                          <a:latin typeface="Helvetica Neue"/>
+                          <a:ea typeface="Helvetica Neue"/>
+                          <a:cs typeface="Helvetica Neue"/>
+                          <a:sym typeface="Helvetica Neue"/>
+                        </a:rPr>
+                        <a:t>Express</a:t>
+                      </a:r>
+                    </a:p>
+                  </a:txBody>
+                  <a:tcPr marL="165100" marR="165100" marT="76200" marB="76200" anchor="ctr" anchorCtr="0" horzOverflow="overflow">
+                    <a:lnL w="12700">
+                      <a:solidFill>
+                        <a:srgbClr val="DDDDDD"/>
+                      </a:solidFill>
+                      <a:miter lim="400000"/>
+                    </a:lnL>
+                    <a:lnR w="12700">
+                      <a:solidFill>
+                        <a:srgbClr val="DDDDDD"/>
+                      </a:solidFill>
+                      <a:miter lim="400000"/>
+                    </a:lnR>
+                    <a:lnT w="12700">
+                      <a:solidFill>
+                        <a:srgbClr val="DDDDDD"/>
+                      </a:solidFill>
+                      <a:miter lim="400000"/>
+                    </a:lnT>
+                    <a:lnB w="12700">
+                      <a:solidFill>
+                        <a:srgbClr val="DDDDDD"/>
+                      </a:solidFill>
+                      <a:miter lim="400000"/>
+                    </a:lnB>
+                  </a:tcPr>
+                </a:tc>
+                <a:tc>
+                  <a:txBody>
+                    <a:bodyPr/>
+                    <a:lstStyle/>
+                    <a:p>
+                      <a:pPr lvl="0" algn="l" defTabSz="914400"/>
+                      <a:r>
+                        <a:rPr sz="1600">
+                          <a:solidFill>
+                            <a:srgbClr val="323333"/>
+                          </a:solidFill>
+                          <a:latin typeface="Helvetica Neue"/>
+                          <a:ea typeface="Helvetica Neue"/>
+                          <a:cs typeface="Helvetica Neue"/>
+                          <a:sym typeface="Helvetica Neue"/>
+                        </a:rPr>
+                        <a:t>6330.13</a:t>
+                      </a:r>
+                    </a:p>
+                  </a:txBody>
+                  <a:tcPr marL="165100" marR="165100" marT="76200" marB="76200" anchor="ctr" anchorCtr="0" horzOverflow="overflow">
+                    <a:lnL w="12700">
+                      <a:solidFill>
+                        <a:srgbClr val="DDDDDD"/>
+                      </a:solidFill>
+                      <a:miter lim="400000"/>
+                    </a:lnL>
+                    <a:lnR w="12700">
+                      <a:solidFill>
+                        <a:srgbClr val="DDDDDD"/>
+                      </a:solidFill>
+                      <a:miter lim="400000"/>
+                    </a:lnR>
+                    <a:lnT w="12700">
+                      <a:solidFill>
+                        <a:srgbClr val="DDDDDD"/>
+                      </a:solidFill>
+                      <a:miter lim="400000"/>
+                    </a:lnT>
+                    <a:lnB w="12700">
+                      <a:solidFill>
+                        <a:srgbClr val="DDDDDD"/>
+                      </a:solidFill>
+                      <a:miter lim="400000"/>
+                    </a:lnB>
+                  </a:tcPr>
+                </a:tc>
+                <a:tc>
+                  <a:txBody>
+                    <a:bodyPr/>
+                    <a:lstStyle/>
+                    <a:p>
+                      <a:pPr lvl="0" algn="l" defTabSz="914400"/>
+                      <a:r>
+                        <a:rPr sz="1600">
+                          <a:solidFill>
+                            <a:srgbClr val="323333"/>
+                          </a:solidFill>
+                          <a:latin typeface="Helvetica Neue"/>
+                          <a:ea typeface="Helvetica Neue"/>
+                          <a:cs typeface="Helvetica Neue"/>
+                          <a:sym typeface="Helvetica Neue"/>
+                        </a:rPr>
+                        <a:t>15.89</a:t>
+                      </a:r>
+                    </a:p>
+                  </a:txBody>
+                  <a:tcPr marL="165100" marR="165100" marT="76200" marB="76200" anchor="ctr" anchorCtr="0" horzOverflow="overflow">
+                    <a:lnL w="12700">
+                      <a:solidFill>
+                        <a:srgbClr val="DDDDDD"/>
+                      </a:solidFill>
+                      <a:miter lim="400000"/>
+                    </a:lnL>
+                    <a:lnR w="12700">
+                      <a:solidFill>
+                        <a:srgbClr val="DDDDDD"/>
+                      </a:solidFill>
+                      <a:miter lim="400000"/>
+                    </a:lnR>
+                    <a:lnT w="12700">
+                      <a:solidFill>
+                        <a:srgbClr val="DDDDDD"/>
+                      </a:solidFill>
+                      <a:miter lim="400000"/>
+                    </a:lnT>
+                    <a:lnB w="12700">
+                      <a:solidFill>
+                        <a:srgbClr val="DDDDDD"/>
+                      </a:solidFill>
+                      <a:miter lim="400000"/>
+                    </a:lnB>
+                  </a:tcPr>
+                </a:tc>
+                <a:tc>
+                  <a:txBody>
+                    <a:bodyPr/>
+                    <a:lstStyle/>
+                    <a:p>
+                      <a:pPr lvl="0" algn="l" defTabSz="914400"/>
+                      <a:r>
+                        <a:rPr sz="1600">
+                          <a:solidFill>
+                            <a:srgbClr val="323333"/>
+                          </a:solidFill>
+                          <a:latin typeface="Helvetica Neue"/>
+                          <a:ea typeface="Helvetica Neue"/>
+                          <a:cs typeface="Helvetica Neue"/>
+                          <a:sym typeface="Helvetica Neue"/>
+                        </a:rPr>
+                        <a:t>1.70</a:t>
+                      </a:r>
+                    </a:p>
+                  </a:txBody>
+                  <a:tcPr marL="165100" marR="165100" marT="76200" marB="76200" anchor="ctr" anchorCtr="0" horzOverflow="overflow">
+                    <a:lnL w="12700">
+                      <a:solidFill>
+                        <a:srgbClr val="DDDDDD"/>
+                      </a:solidFill>
+                      <a:miter lim="400000"/>
+                    </a:lnL>
+                    <a:lnR w="12700">
+                      <a:solidFill>
+                        <a:srgbClr val="DDDDDD"/>
+                      </a:solidFill>
+                      <a:miter lim="400000"/>
+                    </a:lnR>
+                    <a:lnT w="12700">
+                      <a:solidFill>
+                        <a:srgbClr val="DDDDDD"/>
+                      </a:solidFill>
+                      <a:miter lim="400000"/>
+                    </a:lnT>
+                    <a:lnB w="12700">
+                      <a:solidFill>
+                        <a:srgbClr val="DDDDDD"/>
+                      </a:solidFill>
+                      <a:miter lim="400000"/>
+                    </a:lnB>
+                  </a:tcPr>
+                </a:tc>
+              </a:tr>
+              <a:tr h="816428">
+                <a:tc>
+                  <a:txBody>
+                    <a:bodyPr/>
+                    <a:lstStyle/>
+                    <a:p>
+                      <a:pPr lvl="0" algn="l" defTabSz="914400"/>
+                      <a:r>
+                        <a:rPr sz="1600">
+                          <a:solidFill>
+                            <a:srgbClr val="323333"/>
+                          </a:solidFill>
+                          <a:latin typeface="Helvetica Neue"/>
+                          <a:ea typeface="Helvetica Neue"/>
+                          <a:cs typeface="Helvetica Neue"/>
+                          <a:sym typeface="Helvetica Neue"/>
+                        </a:rPr>
+                        <a:t>Rails</a:t>
+                      </a:r>
+                    </a:p>
+                  </a:txBody>
+                  <a:tcPr marL="165100" marR="165100" marT="76200" marB="76200" anchor="ctr" anchorCtr="0" horzOverflow="overflow">
+                    <a:lnL w="12700">
+                      <a:solidFill>
+                        <a:srgbClr val="DDDDDD"/>
+                      </a:solidFill>
+                      <a:miter lim="400000"/>
+                    </a:lnL>
+                    <a:lnR w="12700">
+                      <a:solidFill>
+                        <a:srgbClr val="DDDDDD"/>
+                      </a:solidFill>
+                      <a:miter lim="400000"/>
+                    </a:lnR>
+                    <a:lnT w="12700">
+                      <a:solidFill>
+                        <a:srgbClr val="DDDDDD"/>
+                      </a:solidFill>
+                      <a:miter lim="400000"/>
+                    </a:lnT>
+                    <a:lnB w="12700">
+                      <a:solidFill>
+                        <a:srgbClr val="DDDDDD"/>
+                      </a:solidFill>
+                      <a:miter lim="400000"/>
+                    </a:lnB>
+                    <a:solidFill>
+                      <a:srgbClr val="F8F8F8"/>
+                    </a:solidFill>
+                  </a:tcPr>
+                </a:tc>
+                <a:tc>
+                  <a:txBody>
+                    <a:bodyPr/>
+                    <a:lstStyle/>
+                    <a:p>
+                      <a:pPr lvl="0" algn="l" defTabSz="914400"/>
+                      <a:r>
+                        <a:rPr sz="1600">
+                          <a:solidFill>
+                            <a:srgbClr val="323333"/>
+                          </a:solidFill>
+                          <a:latin typeface="Helvetica Neue"/>
+                          <a:ea typeface="Helvetica Neue"/>
+                          <a:cs typeface="Helvetica Neue"/>
+                          <a:sym typeface="Helvetica Neue"/>
+                        </a:rPr>
+                        <a:t>2275.33</a:t>
+                      </a:r>
+                    </a:p>
+                  </a:txBody>
+                  <a:tcPr marL="165100" marR="165100" marT="76200" marB="76200" anchor="ctr" anchorCtr="0" horzOverflow="overflow">
+                    <a:lnL w="12700">
+                      <a:solidFill>
+                        <a:srgbClr val="DDDDDD"/>
+                      </a:solidFill>
+                      <a:miter lim="400000"/>
+                    </a:lnL>
+                    <a:lnR w="12700">
+                      <a:solidFill>
+                        <a:srgbClr val="DDDDDD"/>
+                      </a:solidFill>
+                      <a:miter lim="400000"/>
+                    </a:lnR>
+                    <a:lnT w="12700">
+                      <a:solidFill>
+                        <a:srgbClr val="DDDDDD"/>
+                      </a:solidFill>
+                      <a:miter lim="400000"/>
+                    </a:lnT>
+                    <a:lnB w="12700">
+                      <a:solidFill>
+                        <a:srgbClr val="DDDDDD"/>
+                      </a:solidFill>
+                      <a:miter lim="400000"/>
+                    </a:lnB>
+                    <a:solidFill>
+                      <a:srgbClr val="F8F8F8"/>
+                    </a:solidFill>
+                  </a:tcPr>
+                </a:tc>
+                <a:tc>
+                  <a:txBody>
+                    <a:bodyPr/>
+                    <a:lstStyle/>
+                    <a:p>
+                      <a:pPr lvl="0" algn="l" defTabSz="914400"/>
+                      <a:r>
+                        <a:rPr sz="1600">
+                          <a:solidFill>
+                            <a:srgbClr val="323333"/>
+                          </a:solidFill>
+                          <a:latin typeface="Helvetica Neue"/>
+                          <a:ea typeface="Helvetica Neue"/>
+                          <a:cs typeface="Helvetica Neue"/>
+                          <a:sym typeface="Helvetica Neue"/>
+                        </a:rPr>
+                        <a:t>15.78</a:t>
+                      </a:r>
+                    </a:p>
+                  </a:txBody>
+                  <a:tcPr marL="165100" marR="165100" marT="76200" marB="76200" anchor="ctr" anchorCtr="0" horzOverflow="overflow">
+                    <a:lnL w="12700">
+                      <a:solidFill>
+                        <a:srgbClr val="DDDDDD"/>
+                      </a:solidFill>
+                      <a:miter lim="400000"/>
+                    </a:lnL>
+                    <a:lnR w="12700">
+                      <a:solidFill>
+                        <a:srgbClr val="DDDDDD"/>
+                      </a:solidFill>
+                      <a:miter lim="400000"/>
+                    </a:lnR>
+                    <a:lnT w="12700">
+                      <a:solidFill>
+                        <a:srgbClr val="DDDDDD"/>
+                      </a:solidFill>
+                      <a:miter lim="400000"/>
+                    </a:lnT>
+                    <a:lnB w="12700">
+                      <a:solidFill>
+                        <a:srgbClr val="DDDDDD"/>
+                      </a:solidFill>
+                      <a:miter lim="400000"/>
+                    </a:lnB>
+                    <a:solidFill>
+                      <a:srgbClr val="F8F8F8"/>
+                    </a:solidFill>
+                  </a:tcPr>
+                </a:tc>
+                <a:tc>
+                  <a:txBody>
+                    <a:bodyPr/>
+                    <a:lstStyle/>
+                    <a:p>
+                      <a:pPr lvl="0" algn="l" defTabSz="914400"/>
+                      <a:r>
+                        <a:rPr sz="1600">
+                          <a:solidFill>
+                            <a:srgbClr val="323333"/>
+                          </a:solidFill>
+                          <a:latin typeface="Helvetica Neue"/>
+                          <a:ea typeface="Helvetica Neue"/>
+                          <a:cs typeface="Helvetica Neue"/>
+                          <a:sym typeface="Helvetica Neue"/>
+                        </a:rPr>
+                        <a:t>12.94</a:t>
+                      </a:r>
+                    </a:p>
+                  </a:txBody>
+                  <a:tcPr marL="165100" marR="165100" marT="76200" marB="76200" anchor="ctr" anchorCtr="0" horzOverflow="overflow">
+                    <a:lnL w="12700">
+                      <a:solidFill>
+                        <a:srgbClr val="DDDDDD"/>
+                      </a:solidFill>
+                      <a:miter lim="400000"/>
+                    </a:lnL>
+                    <a:lnR w="12700">
+                      <a:solidFill>
+                        <a:srgbClr val="DDDDDD"/>
+                      </a:solidFill>
+                      <a:miter lim="400000"/>
+                    </a:lnR>
+                    <a:lnT w="12700">
+                      <a:solidFill>
+                        <a:srgbClr val="DDDDDD"/>
+                      </a:solidFill>
+                      <a:miter lim="400000"/>
+                    </a:lnT>
+                    <a:lnB w="12700">
+                      <a:solidFill>
+                        <a:srgbClr val="DDDDDD"/>
+                      </a:solidFill>
+                      <a:miter lim="400000"/>
+                    </a:lnB>
+                    <a:solidFill>
+                      <a:srgbClr val="F8F8F8"/>
+                    </a:solidFill>
+                  </a:tcPr>
+                </a:tc>
+              </a:tr>
+            </a:tbl>
+          </a:graphicData>
+        </a:graphic>
+      </p:graphicFrame>
+    </p:spTree>
+  </p:cSld>
+  <p:clrMapOvr>
+    <a:masterClrMapping/>
+  </p:clrMapOvr>
+  <p:transition spd="med" advClick="1"/>
+</p:sld>
+</file>
+
+<file path=ppt/slides/slide19.xml><?xml version="1.0" encoding="utf-8"?>
+<p:sld xmlns:a="http://schemas.openxmlformats.org/drawingml/2006/main" xmlns:r="http://schemas.openxmlformats.org/officeDocument/2006/relationships" xmlns:p="http://schemas.openxmlformats.org/presentationml/2006/main" showMasterSp="1" showMasterPhAnim="1">
+  <p:cSld>
+    <p:spTree>
+      <p:nvGrpSpPr>
+        <p:cNvPr id="1" name=""/>
+        <p:cNvGrpSpPr/>
+        <p:nvPr/>
+      </p:nvGrpSpPr>
+      <p:grpSpPr>
+        <a:xfrm>
+          <a:off x="0" y="0"/>
+          <a:ext cx="0" cy="0"/>
+          <a:chOff x="0" y="0"/>
+          <a:chExt cx="0" cy="0"/>
+        </a:xfrm>
+      </p:grpSpPr>
       <p:pic>
         <p:nvPicPr>
-          <p:cNvPr id="91" name="Link-from-Twilight-Princess-twilight-princess-19802252-597-448.jpg"/>
+          <p:cNvPr id="98" name="Link-from-Twilight-Princess-twilight-princess-19802252-597-448.jpg"/>
           <p:cNvPicPr/>
           <p:nvPr/>
         </p:nvPicPr>
@@ -4202,7 +5834,87 @@
 </p:sld>
 </file>
 
-<file path=ppt/slides/slide18.xml><?xml version="1.0" encoding="utf-8"?>
+<file path=ppt/slides/slide2.xml><?xml version="1.0" encoding="utf-8"?>
+<p:sld xmlns:a="http://schemas.openxmlformats.org/drawingml/2006/main" xmlns:r="http://schemas.openxmlformats.org/officeDocument/2006/relationships" xmlns:p="http://schemas.openxmlformats.org/presentationml/2006/main" showMasterSp="1" showMasterPhAnim="1">
+  <p:cSld>
+    <p:spTree>
+      <p:nvGrpSpPr>
+        <p:cNvPr id="1" name=""/>
+        <p:cNvGrpSpPr/>
+        <p:nvPr/>
+      </p:nvGrpSpPr>
+      <p:grpSpPr>
+        <a:xfrm>
+          <a:off x="0" y="0"/>
+          <a:ext cx="0" cy="0"/>
+          <a:chOff x="0" y="0"/>
+          <a:chExt cx="0" cy="0"/>
+        </a:xfrm>
+      </p:grpSpPr>
+      <p:sp>
+        <p:nvSpPr>
+          <p:cNvPr id="39" name="Shape 39"/>
+          <p:cNvSpPr/>
+          <p:nvPr>
+            <p:ph type="title"/>
+          </p:nvPr>
+        </p:nvSpPr>
+        <p:spPr>
+          <a:prstGeom prst="rect">
+            <a:avLst/>
+          </a:prstGeom>
+        </p:spPr>
+        <p:txBody>
+          <a:bodyPr/>
+          <a:lstStyle/>
+          <a:p>
+            <a:pPr lvl="0">
+              <a:defRPr sz="1800"/>
+            </a:pPr>
+            <a:r>
+              <a:rPr sz="8000"/>
+              <a:t>Objetivo</a:t>
+            </a:r>
+          </a:p>
+        </p:txBody>
+      </p:sp>
+      <p:sp>
+        <p:nvSpPr>
+          <p:cNvPr id="40" name="Shape 40"/>
+          <p:cNvSpPr/>
+          <p:nvPr>
+            <p:ph type="body" idx="1"/>
+          </p:nvPr>
+        </p:nvSpPr>
+        <p:spPr>
+          <a:prstGeom prst="rect">
+            <a:avLst/>
+          </a:prstGeom>
+        </p:spPr>
+        <p:txBody>
+          <a:bodyPr/>
+          <a:lstStyle/>
+          <a:p>
+            <a:pPr lvl="0">
+              <a:defRPr sz="1800"/>
+            </a:pPr>
+            <a:r>
+              <a:rPr sz="3600"/>
+              <a:t>Introduzir o conceito de programação funcional e praticar alguns de seus conceitos</a:t>
+            </a:r>
+          </a:p>
+        </p:txBody>
+      </p:sp>
+    </p:spTree>
+  </p:cSld>
+  <p:clrMapOvr>
+    <a:masterClrMapping/>
+  </p:clrMapOvr>
+  <p:transition spd="med" advClick="1"/>
+</p:sld>
+</file>
+
+<file path=ppt/slides/slide20.xml><?xml version="1.0" encoding="utf-8"?>
 <p:sld xmlns:a="http://schemas.openxmlformats.org/drawingml/2006/main" xmlns:r="http://schemas.openxmlformats.org/officeDocument/2006/relationships" xmlns:p="http://schemas.openxmlformats.org/presentationml/2006/main" showMasterSp="1" showMasterPhAnim="1">
   <p:cSld>
     <p:spTree>
@@ -4221,7 +5933,7 @@
       </p:grpSpPr>
       <p:pic>
         <p:nvPicPr>
-          <p:cNvPr id="93" name="dark-souls-2-game-dragon-hd-wallpaper-1920x1080.jpg"/>
+          <p:cNvPr id="100" name="dark-souls-2-game-dragon-hd-wallpaper-1920x1080.jpg"/>
           <p:cNvPicPr/>
           <p:nvPr/>
         </p:nvPicPr>
@@ -4285,7 +5997,7 @@
                                       <p:cBhvr>
                                         <p:cTn id="6" fill="hold"/>
                                         <p:tgtEl>
-                                          <p:spTgt spid="93"/>
+                                          <p:spTgt spid="100"/>
                                         </p:tgtEl>
                                         <p:attrNameLst>
                                           <p:attrName>style.visibility</p:attrName>
@@ -4299,7 +6011,7 @@
                                       <p:cBhvr>
                                         <p:cTn id="7" dur="2500"/>
                                         <p:tgtEl>
-                                          <p:spTgt spid="93"/>
+                                          <p:spTgt spid="100"/>
                                         </p:tgtEl>
                                       </p:cBhvr>
                                     </p:animEffect>
@@ -4334,13 +6046,13 @@
       </p:par>
     </p:tnLst>
     <p:bldLst>
-      <p:bldP build="whole" bldLvl="1" animBg="1" rev="0" advAuto="0" spid="93" grpId="1"/>
+      <p:bldP build="whole" bldLvl="1" animBg="1" rev="0" advAuto="0" spid="100" grpId="1"/>
     </p:bldLst>
   </p:timing>
 </p:sld>
 </file>
 
-<file path=ppt/slides/slide19.xml><?xml version="1.0" encoding="utf-8"?>
+<file path=ppt/slides/slide21.xml><?xml version="1.0" encoding="utf-8"?>
 <p:sld xmlns:a="http://schemas.openxmlformats.org/drawingml/2006/main" xmlns:r="http://schemas.openxmlformats.org/officeDocument/2006/relationships" xmlns:p="http://schemas.openxmlformats.org/presentationml/2006/main" showMasterSp="1" showMasterPhAnim="1">
   <p:cSld>
     <p:spTree>
@@ -4359,7 +6071,7 @@
       </p:grpSpPr>
       <p:sp>
         <p:nvSpPr>
-          <p:cNvPr id="95" name="Shape 95"/>
+          <p:cNvPr id="102" name="Shape 102"/>
           <p:cNvSpPr/>
           <p:nvPr/>
         </p:nvSpPr>
@@ -4396,86 +6108,6 @@
             <a:r>
               <a:rPr sz="3800"/>
               <a:t>“Obrigado! Não parem nunca de tentar.” </a:t>
-            </a:r>
-          </a:p>
-        </p:txBody>
-      </p:sp>
-    </p:spTree>
-  </p:cSld>
-  <p:clrMapOvr>
-    <a:masterClrMapping/>
-  </p:clrMapOvr>
-  <p:transition spd="med" advClick="1"/>
-</p:sld>
-</file>
-
-<file path=ppt/slides/slide2.xml><?xml version="1.0" encoding="utf-8"?>
-<p:sld xmlns:a="http://schemas.openxmlformats.org/drawingml/2006/main" xmlns:r="http://schemas.openxmlformats.org/officeDocument/2006/relationships" xmlns:p="http://schemas.openxmlformats.org/presentationml/2006/main" showMasterSp="1" showMasterPhAnim="1">
-  <p:cSld>
-    <p:spTree>
-      <p:nvGrpSpPr>
-        <p:cNvPr id="1" name=""/>
-        <p:cNvGrpSpPr/>
-        <p:nvPr/>
-      </p:nvGrpSpPr>
-      <p:grpSpPr>
-        <a:xfrm>
-          <a:off x="0" y="0"/>
-          <a:ext cx="0" cy="0"/>
-          <a:chOff x="0" y="0"/>
-          <a:chExt cx="0" cy="0"/>
-        </a:xfrm>
-      </p:grpSpPr>
-      <p:sp>
-        <p:nvSpPr>
-          <p:cNvPr id="39" name="Shape 39"/>
-          <p:cNvSpPr/>
-          <p:nvPr>
-            <p:ph type="title"/>
-          </p:nvPr>
-        </p:nvSpPr>
-        <p:spPr>
-          <a:prstGeom prst="rect">
-            <a:avLst/>
-          </a:prstGeom>
-        </p:spPr>
-        <p:txBody>
-          <a:bodyPr/>
-          <a:lstStyle/>
-          <a:p>
-            <a:pPr lvl="0">
-              <a:defRPr sz="1800"/>
-            </a:pPr>
-            <a:r>
-              <a:rPr sz="8000"/>
-              <a:t>Objetivo</a:t>
-            </a:r>
-          </a:p>
-        </p:txBody>
-      </p:sp>
-      <p:sp>
-        <p:nvSpPr>
-          <p:cNvPr id="40" name="Shape 40"/>
-          <p:cNvSpPr/>
-          <p:nvPr>
-            <p:ph type="body" idx="1"/>
-          </p:nvPr>
-        </p:nvSpPr>
-        <p:spPr>
-          <a:prstGeom prst="rect">
-            <a:avLst/>
-          </a:prstGeom>
-        </p:spPr>
-        <p:txBody>
-          <a:bodyPr/>
-          <a:lstStyle/>
-          <a:p>
-            <a:pPr lvl="0">
-              <a:defRPr sz="1800"/>
-            </a:pPr>
-            <a:r>
-              <a:rPr sz="3600"/>
-              <a:t>Introduzir o conceito de programação funcional e praticar alguns de seus conceitos</a:t>
             </a:r>
           </a:p>
         </p:txBody>

</xml_diff>